<commit_message>
small graphic slide update
</commit_message>
<xml_diff>
--- a/calogero/presentation_with_style.pptx
+++ b/calogero/presentation_with_style.pptx
@@ -11861,6 +11861,36 @@
           <a:chExt cx="0" cy="0"/>
         </a:xfrm>
       </p:grpSpPr>
+      <p:pic>
+        <p:nvPicPr>
+          <p:cNvPr id="41" name="Immagine 40" descr="Immagine che contiene testo, Arte bambini, schermata, pianta&#10;&#10;Descrizione generata automaticamente">
+            <a:extLst>
+              <a:ext uri="{FF2B5EF4-FFF2-40B4-BE49-F238E27FC236}">
+                <a16:creationId xmlns:a16="http://schemas.microsoft.com/office/drawing/2014/main" id="{AB6D0264-13E4-CFDD-727B-BB8C8576D1E2}"/>
+              </a:ext>
+            </a:extLst>
+          </p:cNvPr>
+          <p:cNvPicPr>
+            <a:picLocks noChangeAspect="1"/>
+          </p:cNvPicPr>
+          <p:nvPr/>
+        </p:nvPicPr>
+        <p:blipFill>
+          <a:blip r:embed="rId3"/>
+          <a:stretch>
+            <a:fillRect/>
+          </a:stretch>
+        </p:blipFill>
+        <p:spPr>
+          <a:xfrm>
+            <a:off x="831240" y="2235444"/>
+            <a:ext cx="3935290" cy="2672859"/>
+          </a:xfrm>
+          <a:prstGeom prst="rect">
+            <a:avLst/>
+          </a:prstGeom>
+        </p:spPr>
+      </p:pic>
       <p:sp>
         <p:nvSpPr>
           <p:cNvPr id="244" name="Google Shape;244;p28"/>
@@ -11910,36 +11940,6 @@
           </a:p>
         </p:txBody>
       </p:sp>
-      <p:pic>
-        <p:nvPicPr>
-          <p:cNvPr id="41" name="Immagine 40" descr="Immagine che contiene testo, Arte bambini, schermata, pianta&#10;&#10;Descrizione generata automaticamente">
-            <a:extLst>
-              <a:ext uri="{FF2B5EF4-FFF2-40B4-BE49-F238E27FC236}">
-                <a16:creationId xmlns:a16="http://schemas.microsoft.com/office/drawing/2014/main" id="{AB6D0264-13E4-CFDD-727B-BB8C8576D1E2}"/>
-              </a:ext>
-            </a:extLst>
-          </p:cNvPr>
-          <p:cNvPicPr>
-            <a:picLocks noChangeAspect="1"/>
-          </p:cNvPicPr>
-          <p:nvPr/>
-        </p:nvPicPr>
-        <p:blipFill>
-          <a:blip r:embed="rId3"/>
-          <a:stretch>
-            <a:fillRect/>
-          </a:stretch>
-        </p:blipFill>
-        <p:spPr>
-          <a:xfrm>
-            <a:off x="831240" y="2235444"/>
-            <a:ext cx="3935290" cy="2672859"/>
-          </a:xfrm>
-          <a:prstGeom prst="rect">
-            <a:avLst/>
-          </a:prstGeom>
-        </p:spPr>
-      </p:pic>
       <p:sp>
         <p:nvSpPr>
           <p:cNvPr id="43" name="Google Shape;412;p31">
@@ -16405,20 +16405,20 @@
 </file>
 
 <file path=customXml/item1.xml><?xml version="1.0" encoding="utf-8"?>
+<p:properties xmlns:p="http://schemas.microsoft.com/office/2006/metadata/properties" xmlns:xsi="http://www.w3.org/2001/XMLSchema-instance" xmlns:pc="http://schemas.microsoft.com/office/infopath/2007/PartnerControls">
+  <documentManagement>
+    <_activity xmlns="370fadae-9f1a-4ef1-b74d-327f0c6d8369" xsi:nil="true"/>
+  </documentManagement>
+</p:properties>
+</file>
+
+<file path=customXml/item2.xml><?xml version="1.0" encoding="utf-8"?>
 <?mso-contentType ?>
 <FormTemplates xmlns="http://schemas.microsoft.com/sharepoint/v3/contenttype/forms">
   <Display>DocumentLibraryForm</Display>
   <Edit>DocumentLibraryForm</Edit>
   <New>DocumentLibraryForm</New>
 </FormTemplates>
-</file>
-
-<file path=customXml/item2.xml><?xml version="1.0" encoding="utf-8"?>
-<p:properties xmlns:p="http://schemas.microsoft.com/office/2006/metadata/properties" xmlns:xsi="http://www.w3.org/2001/XMLSchema-instance" xmlns:pc="http://schemas.microsoft.com/office/infopath/2007/PartnerControls">
-  <documentManagement>
-    <_activity xmlns="370fadae-9f1a-4ef1-b74d-327f0c6d8369" xsi:nil="true"/>
-  </documentManagement>
-</p:properties>
 </file>
 
 <file path=customXml/item3.xml><?xml version="1.0" encoding="utf-8"?>
@@ -16641,14 +16641,6 @@
 </file>
 
 <file path=customXml/itemProps1.xml><?xml version="1.0" encoding="utf-8"?>
-<ds:datastoreItem xmlns:ds="http://schemas.openxmlformats.org/officeDocument/2006/customXml" ds:itemID="{7547DA4F-0FE5-4787-BC3C-C3E8A8E228AA}">
-  <ds:schemaRefs>
-    <ds:schemaRef ds:uri="http://schemas.microsoft.com/sharepoint/v3/contenttype/forms"/>
-  </ds:schemaRefs>
-</ds:datastoreItem>
-</file>
-
-<file path=customXml/itemProps2.xml><?xml version="1.0" encoding="utf-8"?>
 <ds:datastoreItem xmlns:ds="http://schemas.openxmlformats.org/officeDocument/2006/customXml" ds:itemID="{F3E28D79-0A08-4521-81E5-B5A78E6E5992}">
   <ds:schemaRefs>
     <ds:schemaRef ds:uri="370fadae-9f1a-4ef1-b74d-327f0c6d8369"/>
@@ -16661,6 +16653,14 @@
     <ds:schemaRef ds:uri="http://schemas.microsoft.com/office/infopath/2007/PartnerControls"/>
     <ds:schemaRef ds:uri="http://schemas.openxmlformats.org/package/2006/metadata/core-properties"/>
     <ds:schemaRef ds:uri="http://www.w3.org/XML/1998/namespace"/>
+  </ds:schemaRefs>
+</ds:datastoreItem>
+</file>
+
+<file path=customXml/itemProps2.xml><?xml version="1.0" encoding="utf-8"?>
+<ds:datastoreItem xmlns:ds="http://schemas.openxmlformats.org/officeDocument/2006/customXml" ds:itemID="{7547DA4F-0FE5-4787-BC3C-C3E8A8E228AA}">
+  <ds:schemaRefs>
+    <ds:schemaRef ds:uri="http://schemas.microsoft.com/sharepoint/v3/contenttype/forms"/>
   </ds:schemaRefs>
 </ds:datastoreItem>
 </file>

</xml_diff>